<commit_message>
fixing image on ppt
</commit_message>
<xml_diff>
--- a/20200512_Aplicacoes_Distribuidas_Azure_ServiceBus_Functions/Presentation/ATC_LIVE_POR-Azure_Service_Bus_And_Functions.pptx
+++ b/20200512_Aplicacoes_Distribuidas_Azure_ServiceBus_Functions/Presentation/ATC_LIVE_POR-Azure_Service_Bus_And_Functions.pptx
@@ -7104,7 +7104,7 @@
         </p:blipFill>
         <p:spPr>
           <a:xfrm>
-            <a:off x="0" y="-157504"/>
+            <a:off x="0" y="0"/>
             <a:ext cx="9144000" cy="5143500"/>
           </a:xfrm>
           <a:prstGeom prst="rect">
@@ -10340,20 +10340,20 @@
             <p:ph type="pic" sz="quarter" idx="30"/>
           </p:nvPr>
         </p:nvPicPr>
-        <p:blipFill>
-          <a:blip r:embed="rId4">
-            <a:extLst>
-              <a:ext uri="{28A0092B-C50C-407E-A947-70E740481C1C}">
-                <a14:useLocalDpi xmlns:a14="http://schemas.microsoft.com/office/drawing/2010/main" val="0"/>
-              </a:ext>
-            </a:extLst>
-          </a:blip>
-          <a:srcRect t="7076" b="7076"/>
-          <a:stretch>
-            <a:fillRect/>
-          </a:stretch>
+        <p:blipFill rotWithShape="1">
+          <a:blip r:embed="rId4"/>
+          <a:srcRect t="-84351" b="-84351"/>
+          <a:stretch/>
         </p:blipFill>
-        <p:spPr/>
+        <p:spPr>
+          <a:xfrm>
+            <a:off x="-2357" y="0"/>
+            <a:ext cx="5104614" cy="5143500"/>
+          </a:xfrm>
+          <a:solidFill>
+            <a:schemeClr val="bg1"/>
+          </a:solidFill>
+        </p:spPr>
       </p:pic>
     </p:spTree>
     <p:extLst>
@@ -20134,15 +20134,6 @@
 </file>
 
 <file path=customXml/item1.xml><?xml version="1.0" encoding="utf-8"?>
-<?mso-contentType ?>
-<FormTemplates xmlns="http://schemas.microsoft.com/sharepoint/v3/contenttype/forms">
-  <Display>DocumentLibraryForm</Display>
-  <Edit>DocumentLibraryForm</Edit>
-  <New>DocumentLibraryForm</New>
-</FormTemplates>
-</file>
-
-<file path=customXml/item2.xml><?xml version="1.0" encoding="utf-8"?>
 <ct:contentTypeSchema xmlns:ct="http://schemas.microsoft.com/office/2006/metadata/contentType" xmlns:ma="http://schemas.microsoft.com/office/2006/metadata/properties/metaAttributes" ct:_="" ma:_="" ma:contentTypeName="Document" ma:contentTypeID="0x010100D6781A55F0BE3E48BC8C9FB108D198ED" ma:contentTypeVersion="17" ma:contentTypeDescription="Create a new document." ma:contentTypeScope="" ma:versionID="473d9197b5e7a7bfc878db931fdc1d14">
   <xsd:schema xmlns:xsd="http://www.w3.org/2001/XMLSchema" xmlns:xs="http://www.w3.org/2001/XMLSchema" xmlns:p="http://schemas.microsoft.com/office/2006/metadata/properties" xmlns:ns1="http://schemas.microsoft.com/sharepoint/v3" xmlns:ns2="a5eda85e-4ee9-406b-a2a5-1662b87046bf" xmlns:ns3="867fe99a-15dc-44f6-97b7-fd4aebac0d95" targetNamespace="http://schemas.microsoft.com/office/2006/metadata/properties" ma:root="true" ma:fieldsID="74417c836a96a8903e3afde4e5b1ba12" ns1:_="" ns2:_="" ns3:_="">
     <xsd:import namespace="http://schemas.microsoft.com/sharepoint/v3"/>
@@ -20396,6 +20387,15 @@
 </ct:contentTypeSchema>
 </file>
 
+<file path=customXml/item2.xml><?xml version="1.0" encoding="utf-8"?>
+<?mso-contentType ?>
+<FormTemplates xmlns="http://schemas.microsoft.com/sharepoint/v3/contenttype/forms">
+  <Display>DocumentLibraryForm</Display>
+  <Edit>DocumentLibraryForm</Edit>
+  <New>DocumentLibraryForm</New>
+</FormTemplates>
+</file>
+
 <file path=customXml/item3.xml><?xml version="1.0" encoding="utf-8"?>
 <p:properties xmlns:p="http://schemas.microsoft.com/office/2006/metadata/properties" xmlns:xsi="http://www.w3.org/2001/XMLSchema-instance" xmlns:pc="http://schemas.microsoft.com/office/infopath/2007/PartnerControls">
   <documentManagement>
@@ -20408,14 +20408,6 @@
 </file>
 
 <file path=customXml/itemProps1.xml><?xml version="1.0" encoding="utf-8"?>
-<ds:datastoreItem xmlns:ds="http://schemas.openxmlformats.org/officeDocument/2006/customXml" ds:itemID="{26B1890E-EF8E-4854-8282-610794CFAFA5}">
-  <ds:schemaRefs>
-    <ds:schemaRef ds:uri="http://schemas.microsoft.com/sharepoint/v3/contenttype/forms"/>
-  </ds:schemaRefs>
-</ds:datastoreItem>
-</file>
-
-<file path=customXml/itemProps2.xml><?xml version="1.0" encoding="utf-8"?>
 <ds:datastoreItem xmlns:ds="http://schemas.openxmlformats.org/officeDocument/2006/customXml" ds:itemID="{ADA9C045-FE78-42C5-9982-2400CD339410}">
   <ds:schemaRefs>
     <ds:schemaRef ds:uri="http://schemas.microsoft.com/office/2006/metadata/contentType"/>
@@ -20435,6 +20427,14 @@
 </ds:datastoreItem>
 </file>
 
+<file path=customXml/itemProps2.xml><?xml version="1.0" encoding="utf-8"?>
+<ds:datastoreItem xmlns:ds="http://schemas.openxmlformats.org/officeDocument/2006/customXml" ds:itemID="{26B1890E-EF8E-4854-8282-610794CFAFA5}">
+  <ds:schemaRefs>
+    <ds:schemaRef ds:uri="http://schemas.microsoft.com/sharepoint/v3/contenttype/forms"/>
+  </ds:schemaRefs>
+</ds:datastoreItem>
+</file>
+
 <file path=customXml/itemProps3.xml><?xml version="1.0" encoding="utf-8"?>
 <ds:datastoreItem xmlns:ds="http://schemas.openxmlformats.org/officeDocument/2006/customXml" ds:itemID="{8D738556-CDBB-4FE3-84BC-977924A67A29}">
   <ds:schemaRefs>

</xml_diff>